<commit_message>
updated delegation, certs etc; added diagrams
</commit_message>
<xml_diff>
--- a/voltaire/design-doc/Address-Structure.pptx
+++ b/voltaire/design-doc/Address-Structure.pptx
@@ -3484,7 +3484,7 @@
           <a:lstStyle/>
           <a:p>
             <a:pPr algn="ctr"/>
-            <a:endParaRPr lang="en-US"/>
+            <a:endParaRPr lang="en-US" b="1"/>
           </a:p>
         </p:txBody>
       </p:sp>
@@ -3538,7 +3538,7 @@
           <a:lstStyle/>
           <a:p>
             <a:pPr algn="ctr"/>
-            <a:endParaRPr lang="en-US"/>
+            <a:endParaRPr lang="en-US" b="1"/>
           </a:p>
         </p:txBody>
       </p:sp>
@@ -3592,7 +3592,7 @@
           <a:lstStyle/>
           <a:p>
             <a:pPr algn="ctr"/>
-            <a:endParaRPr lang="en-US"/>
+            <a:endParaRPr lang="en-US" b="1"/>
           </a:p>
         </p:txBody>
       </p:sp>
@@ -3646,7 +3646,7 @@
           <a:lstStyle/>
           <a:p>
             <a:pPr algn="ctr"/>
-            <a:endParaRPr lang="en-US"/>
+            <a:endParaRPr lang="en-US" b="1"/>
           </a:p>
         </p:txBody>
       </p:sp>
@@ -3700,7 +3700,7 @@
           <a:lstStyle/>
           <a:p>
             <a:r>
-              <a:rPr lang="en-US" sz="1600" dirty="0">
+              <a:rPr lang="en-US" sz="1600" b="1" dirty="0">
                 <a:solidFill>
                   <a:schemeClr val="accent1">
                     <a:lumMod val="75000"/>
@@ -3710,7 +3710,7 @@
               <a:t>Payment</a:t>
             </a:r>
             <a:br>
-              <a:rPr lang="en-US" sz="1600" dirty="0">
+              <a:rPr lang="en-US" sz="1600" b="1" dirty="0">
                 <a:solidFill>
                   <a:schemeClr val="accent1">
                     <a:lumMod val="75000"/>
@@ -3719,7 +3719,7 @@
               </a:rPr>
             </a:br>
             <a:r>
-              <a:rPr lang="en-US" sz="1600" dirty="0">
+              <a:rPr lang="en-US" sz="1600" b="1" dirty="0">
                 <a:solidFill>
                   <a:schemeClr val="accent1">
                     <a:lumMod val="75000"/>
@@ -3785,7 +3785,7 @@
           <a:p>
             <a:pPr algn="ctr"/>
             <a:r>
-              <a:rPr lang="en-US" sz="1200" dirty="0">
+              <a:rPr lang="en-US" sz="1200" b="1" dirty="0">
                 <a:solidFill>
                   <a:schemeClr val="tx1"/>
                 </a:solidFill>
@@ -3848,7 +3848,7 @@
           <a:lstStyle/>
           <a:p>
             <a:r>
-              <a:rPr lang="en-US" sz="1200" dirty="0">
+              <a:rPr lang="en-US" sz="1200" b="1" dirty="0">
                 <a:solidFill>
                   <a:schemeClr val="tx1"/>
                 </a:solidFill>
@@ -3911,7 +3911,7 @@
           <a:lstStyle/>
           <a:p>
             <a:r>
-              <a:rPr lang="en-US" sz="1200" dirty="0">
+              <a:rPr lang="en-US" sz="1200" b="1" dirty="0">
                 <a:solidFill>
                   <a:schemeClr val="tx1"/>
                 </a:solidFill>
@@ -3969,14 +3969,14 @@
           <a:p>
             <a:pPr algn="ctr"/>
             <a:r>
-              <a:rPr lang="en-US" sz="1200" dirty="0"/>
+              <a:rPr lang="en-US" sz="1200" b="1" dirty="0"/>
               <a:t>Payment</a:t>
             </a:r>
             <a:br>
-              <a:rPr lang="en-US" sz="1200" dirty="0"/>
+              <a:rPr lang="en-US" sz="1200" b="1" dirty="0"/>
             </a:br>
             <a:r>
-              <a:rPr lang="en-US" sz="1200" dirty="0"/>
+              <a:rPr lang="en-US" sz="1200" b="1" dirty="0"/>
               <a:t>Credential</a:t>
             </a:r>
           </a:p>
@@ -4042,14 +4042,14 @@
           <a:p>
             <a:pPr algn="ctr"/>
             <a:r>
-              <a:rPr lang="en-US" sz="1200" dirty="0"/>
+              <a:rPr lang="en-US" sz="1200" b="1" dirty="0"/>
               <a:t>Stake Address</a:t>
             </a:r>
             <a:br>
-              <a:rPr lang="en-US" sz="1200" dirty="0"/>
+              <a:rPr lang="en-US" sz="1200" b="1" dirty="0"/>
             </a:br>
             <a:r>
-              <a:rPr lang="en-US" sz="1200" dirty="0"/>
+              <a:rPr lang="en-US" sz="1200" b="1" dirty="0"/>
               <a:t>Reference</a:t>
             </a:r>
           </a:p>
@@ -4115,14 +4115,14 @@
           <a:p>
             <a:pPr algn="ctr"/>
             <a:r>
-              <a:rPr lang="en-US" sz="1200" dirty="0"/>
+              <a:rPr lang="en-US" sz="1200" b="1" dirty="0"/>
               <a:t>Vote Address</a:t>
             </a:r>
             <a:br>
-              <a:rPr lang="en-US" sz="1200" dirty="0"/>
+              <a:rPr lang="en-US" sz="1200" b="1" dirty="0"/>
             </a:br>
             <a:r>
-              <a:rPr lang="en-US" sz="1200" dirty="0"/>
+              <a:rPr lang="en-US" sz="1200" b="1" dirty="0"/>
               <a:t>Reference</a:t>
             </a:r>
           </a:p>
@@ -4176,14 +4176,14 @@
           <a:p>
             <a:pPr algn="ctr"/>
             <a:r>
-              <a:rPr lang="en-US" sz="1200" dirty="0"/>
+              <a:rPr lang="en-US" sz="1200" b="1" dirty="0"/>
               <a:t>Payment</a:t>
             </a:r>
             <a:br>
-              <a:rPr lang="en-US" sz="1200" dirty="0"/>
+              <a:rPr lang="en-US" sz="1200" b="1" dirty="0"/>
             </a:br>
             <a:r>
-              <a:rPr lang="en-US" sz="1200" dirty="0"/>
+              <a:rPr lang="en-US" sz="1200" b="1" dirty="0"/>
               <a:t>Verification Key Hash</a:t>
             </a:r>
           </a:p>
@@ -4237,7 +4237,7 @@
           <a:p>
             <a:pPr algn="ctr"/>
             <a:r>
-              <a:rPr lang="en-US" sz="1200" dirty="0"/>
+              <a:rPr lang="en-US" sz="1200" b="1" dirty="0"/>
               <a:t>Script Hash</a:t>
             </a:r>
           </a:p>
@@ -4303,7 +4303,7 @@
           <a:p>
             <a:pPr algn="ctr"/>
             <a:r>
-              <a:rPr lang="en-US" sz="1200" dirty="0"/>
+              <a:rPr lang="en-US" sz="1200" b="1" dirty="0"/>
               <a:t>By Value</a:t>
             </a:r>
           </a:p>
@@ -4367,7 +4367,7 @@
           <a:p>
             <a:pPr algn="ctr"/>
             <a:r>
-              <a:rPr lang="en-US" sz="1200" dirty="0">
+              <a:rPr lang="en-US" sz="1200" b="1" dirty="0">
                 <a:solidFill>
                   <a:schemeClr val="accent6"/>
                 </a:solidFill>
@@ -4435,7 +4435,7 @@
           <a:p>
             <a:pPr algn="ctr"/>
             <a:r>
-              <a:rPr lang="en-US" sz="1200" dirty="0">
+              <a:rPr lang="en-US" sz="1200" b="1" dirty="0">
                 <a:solidFill>
                   <a:schemeClr val="accent6"/>
                 </a:solidFill>
@@ -4503,7 +4503,7 @@
           <a:p>
             <a:pPr algn="ctr"/>
             <a:r>
-              <a:rPr lang="en-US" sz="1200" dirty="0">
+              <a:rPr lang="en-US" sz="1200" b="1" dirty="0">
                 <a:solidFill>
                   <a:schemeClr val="accent2">
                     <a:lumMod val="75000"/>
@@ -4572,7 +4572,7 @@
           <a:lstStyle/>
           <a:p>
             <a:r>
-              <a:rPr lang="en-US" sz="1600" dirty="0">
+              <a:rPr lang="en-US" sz="1600" b="1" dirty="0">
                 <a:solidFill>
                   <a:schemeClr val="accent6">
                     <a:lumMod val="75000"/>
@@ -4582,7 +4582,7 @@
               <a:t>Stake</a:t>
             </a:r>
             <a:br>
-              <a:rPr lang="en-US" sz="1600" dirty="0">
+              <a:rPr lang="en-US" sz="1600" b="1" dirty="0">
                 <a:solidFill>
                   <a:schemeClr val="accent6">
                     <a:lumMod val="75000"/>
@@ -4591,7 +4591,7 @@
               </a:rPr>
             </a:br>
             <a:r>
-              <a:rPr lang="en-US" sz="1600" dirty="0">
+              <a:rPr lang="en-US" sz="1600" b="1" dirty="0">
                 <a:solidFill>
                   <a:schemeClr val="accent6">
                     <a:lumMod val="75000"/>
@@ -4660,7 +4660,7 @@
           <a:lstStyle/>
           <a:p>
             <a:r>
-              <a:rPr lang="en-US" sz="1600" dirty="0">
+              <a:rPr lang="en-US" sz="1600" b="1" dirty="0">
                 <a:solidFill>
                   <a:schemeClr val="accent2">
                     <a:lumMod val="75000"/>
@@ -4670,7 +4670,7 @@
               <a:t>Vote</a:t>
             </a:r>
             <a:br>
-              <a:rPr lang="en-US" sz="1600" dirty="0">
+              <a:rPr lang="en-US" sz="1600" b="1" dirty="0">
                 <a:solidFill>
                   <a:schemeClr val="accent2">
                     <a:lumMod val="75000"/>
@@ -4679,7 +4679,7 @@
               </a:rPr>
             </a:br>
             <a:r>
-              <a:rPr lang="en-US" sz="1600" dirty="0">
+              <a:rPr lang="en-US" sz="1600" b="1" dirty="0">
                 <a:solidFill>
                   <a:schemeClr val="accent2">
                     <a:lumMod val="75000"/>
@@ -4751,14 +4751,14 @@
           <a:p>
             <a:pPr algn="ctr"/>
             <a:r>
-              <a:rPr lang="en-US" sz="1200" dirty="0"/>
+              <a:rPr lang="en-US" sz="1200" b="1" dirty="0"/>
               <a:t>Stake</a:t>
             </a:r>
             <a:br>
-              <a:rPr lang="en-US" sz="1200" dirty="0"/>
+              <a:rPr lang="en-US" sz="1200" b="1" dirty="0"/>
             </a:br>
             <a:r>
-              <a:rPr lang="en-US" sz="1200" dirty="0"/>
+              <a:rPr lang="en-US" sz="1200" b="1" dirty="0"/>
               <a:t>Credential</a:t>
             </a:r>
           </a:p>
@@ -4824,14 +4824,14 @@
           <a:p>
             <a:pPr algn="ctr"/>
             <a:r>
-              <a:rPr lang="en-US" sz="1200" dirty="0"/>
+              <a:rPr lang="en-US" sz="1200" b="1" dirty="0"/>
               <a:t>Stake</a:t>
             </a:r>
             <a:br>
-              <a:rPr lang="en-US" sz="1200" dirty="0"/>
+              <a:rPr lang="en-US" sz="1200" b="1" dirty="0"/>
             </a:br>
             <a:r>
-              <a:rPr lang="en-US" sz="1200" dirty="0"/>
+              <a:rPr lang="en-US" sz="1200" b="1" dirty="0"/>
               <a:t>Verification Key Hash</a:t>
             </a:r>
           </a:p>
@@ -4897,7 +4897,7 @@
           <a:p>
             <a:pPr algn="ctr"/>
             <a:r>
-              <a:rPr lang="en-US" sz="1200" dirty="0"/>
+              <a:rPr lang="en-US" sz="1200" b="1" dirty="0"/>
               <a:t>Script Hash</a:t>
             </a:r>
           </a:p>
@@ -4963,14 +4963,14 @@
           <a:p>
             <a:pPr algn="ctr"/>
             <a:r>
-              <a:rPr lang="en-US" sz="1200" dirty="0"/>
+              <a:rPr lang="en-US" sz="1200" b="1" dirty="0"/>
               <a:t>Vote</a:t>
             </a:r>
             <a:br>
-              <a:rPr lang="en-US" sz="1200" dirty="0"/>
+              <a:rPr lang="en-US" sz="1200" b="1" dirty="0"/>
             </a:br>
             <a:r>
-              <a:rPr lang="en-US" sz="1200" dirty="0"/>
+              <a:rPr lang="en-US" sz="1200" b="1" dirty="0"/>
               <a:t>Credential</a:t>
             </a:r>
           </a:p>
@@ -5036,14 +5036,14 @@
           <a:p>
             <a:pPr algn="ctr"/>
             <a:r>
-              <a:rPr lang="en-US" sz="1200" dirty="0"/>
+              <a:rPr lang="en-US" sz="1200" b="1" dirty="0"/>
               <a:t>Vote</a:t>
             </a:r>
             <a:br>
-              <a:rPr lang="en-US" sz="1200" dirty="0"/>
+              <a:rPr lang="en-US" sz="1200" b="1" dirty="0"/>
             </a:br>
             <a:r>
-              <a:rPr lang="en-US" sz="1200" dirty="0"/>
+              <a:rPr lang="en-US" sz="1200" b="1" dirty="0"/>
               <a:t>Verification Key Hash</a:t>
             </a:r>
           </a:p>
@@ -5512,14 +5512,14 @@
           <a:p>
             <a:pPr algn="ctr"/>
             <a:r>
-              <a:rPr lang="en-US" sz="1200" dirty="0"/>
+              <a:rPr lang="en-US" sz="1200" b="1" dirty="0"/>
               <a:t>Stake</a:t>
             </a:r>
             <a:br>
-              <a:rPr lang="en-US" sz="1200" dirty="0"/>
+              <a:rPr lang="en-US" sz="1200" b="1" dirty="0"/>
             </a:br>
             <a:r>
-              <a:rPr lang="en-US" sz="1200" dirty="0"/>
+              <a:rPr lang="en-US" sz="1200" b="1" dirty="0"/>
               <a:t>Credential</a:t>
             </a:r>
           </a:p>
@@ -5585,14 +5585,14 @@
           <a:p>
             <a:pPr algn="ctr"/>
             <a:r>
-              <a:rPr lang="en-US" sz="1200" dirty="0"/>
+              <a:rPr lang="en-US" sz="1200" b="1" dirty="0"/>
               <a:t>Stake</a:t>
             </a:r>
             <a:br>
-              <a:rPr lang="en-US" sz="1200" dirty="0"/>
+              <a:rPr lang="en-US" sz="1200" b="1" dirty="0"/>
             </a:br>
             <a:r>
-              <a:rPr lang="en-US" sz="1200" dirty="0"/>
+              <a:rPr lang="en-US" sz="1200" b="1" dirty="0"/>
               <a:t>Verification Key Hash</a:t>
             </a:r>
           </a:p>
@@ -5658,7 +5658,7 @@
           <a:p>
             <a:pPr algn="ctr"/>
             <a:r>
-              <a:rPr lang="en-US" sz="1200" dirty="0"/>
+              <a:rPr lang="en-US" sz="1200" b="1" dirty="0"/>
               <a:t>Script Hash</a:t>
             </a:r>
           </a:p>
@@ -5905,7 +5905,7 @@
           <a:p>
             <a:pPr algn="ctr"/>
             <a:r>
-              <a:rPr lang="en-US" sz="1200" dirty="0">
+              <a:rPr lang="en-US" sz="1200" b="1" dirty="0">
                 <a:solidFill>
                   <a:schemeClr val="accent2">
                     <a:lumMod val="75000"/>
@@ -6211,14 +6211,14 @@
           <a:p>
             <a:pPr algn="ctr"/>
             <a:r>
-              <a:rPr lang="en-US" sz="1200" dirty="0"/>
+              <a:rPr lang="en-US" sz="1200" b="1" dirty="0"/>
               <a:t>Script</a:t>
             </a:r>
             <a:br>
-              <a:rPr lang="en-US" sz="1200" dirty="0"/>
+              <a:rPr lang="en-US" sz="1200" b="1" dirty="0"/>
             </a:br>
             <a:r>
-              <a:rPr lang="en-US" sz="1200" dirty="0"/>
+              <a:rPr lang="en-US" sz="1200" b="1" dirty="0"/>
               <a:t>Hash</a:t>
             </a:r>
           </a:p>

</xml_diff>